<commit_message>
Update files and links Add lesson3
</commit_message>
<xml_diff>
--- a/Lesson2/lesson2_python.pptx
+++ b/Lesson2/lesson2_python.pptx
@@ -232,7 +232,7 @@
           <a:p>
             <a:fld id="{2626116C-7091-3747-9920-A77CAB562194}" type="datetimeFigureOut">
               <a:rPr lang="ru-RU" smtClean="0"/>
-              <a:t>27.01.2022</a:t>
+              <a:t>10.12.2023</a:t>
             </a:fld>
             <a:endParaRPr lang="ru-RU"/>
           </a:p>
@@ -2242,7 +2242,7 @@
           <a:p>
             <a:fld id="{2D4BD2F8-9F13-D142-A5F9-752DFF61078B}" type="datetimeFigureOut">
               <a:rPr lang="ru-RU" smtClean="0"/>
-              <a:t>27.01.2022</a:t>
+              <a:t>10.12.2023</a:t>
             </a:fld>
             <a:endParaRPr lang="ru-RU"/>
           </a:p>
@@ -2440,7 +2440,7 @@
           <a:p>
             <a:fld id="{2D4BD2F8-9F13-D142-A5F9-752DFF61078B}" type="datetimeFigureOut">
               <a:rPr lang="ru-RU" smtClean="0"/>
-              <a:t>27.01.2022</a:t>
+              <a:t>10.12.2023</a:t>
             </a:fld>
             <a:endParaRPr lang="ru-RU"/>
           </a:p>
@@ -2648,7 +2648,7 @@
           <a:p>
             <a:fld id="{2D4BD2F8-9F13-D142-A5F9-752DFF61078B}" type="datetimeFigureOut">
               <a:rPr lang="ru-RU" smtClean="0"/>
-              <a:t>27.01.2022</a:t>
+              <a:t>10.12.2023</a:t>
             </a:fld>
             <a:endParaRPr lang="ru-RU"/>
           </a:p>
@@ -2878,7 +2878,7 @@
             </a:pPr>
             <a:fld id="{1D8BD707-D9CF-40AE-B4C6-C98DA3205C09}" type="datetimeFigureOut">
               <a:rPr lang="en-US"/>
-              <a:t>1/27/22</a:t>
+              <a:t>12/10/23</a:t>
             </a:fld>
             <a:endParaRPr lang="en-US"/>
           </a:p>
@@ -3206,7 +3206,7 @@
           <a:p>
             <a:fld id="{2D4BD2F8-9F13-D142-A5F9-752DFF61078B}" type="datetimeFigureOut">
               <a:rPr lang="ru-RU" smtClean="0"/>
-              <a:t>27.01.2022</a:t>
+              <a:t>10.12.2023</a:t>
             </a:fld>
             <a:endParaRPr lang="ru-RU"/>
           </a:p>
@@ -3545,7 +3545,7 @@
           <a:p>
             <a:fld id="{2D4BD2F8-9F13-D142-A5F9-752DFF61078B}" type="datetimeFigureOut">
               <a:rPr lang="ru-RU" smtClean="0"/>
-              <a:t>27.01.2022</a:t>
+              <a:t>10.12.2023</a:t>
             </a:fld>
             <a:endParaRPr lang="ru-RU"/>
           </a:p>
@@ -3810,7 +3810,7 @@
           <a:p>
             <a:fld id="{2D4BD2F8-9F13-D142-A5F9-752DFF61078B}" type="datetimeFigureOut">
               <a:rPr lang="ru-RU" smtClean="0"/>
-              <a:t>27.01.2022</a:t>
+              <a:t>10.12.2023</a:t>
             </a:fld>
             <a:endParaRPr lang="ru-RU"/>
           </a:p>
@@ -4222,7 +4222,7 @@
           <a:p>
             <a:fld id="{2D4BD2F8-9F13-D142-A5F9-752DFF61078B}" type="datetimeFigureOut">
               <a:rPr lang="ru-RU" smtClean="0"/>
-              <a:t>27.01.2022</a:t>
+              <a:t>10.12.2023</a:t>
             </a:fld>
             <a:endParaRPr lang="ru-RU"/>
           </a:p>
@@ -4363,7 +4363,7 @@
           <a:p>
             <a:fld id="{2D4BD2F8-9F13-D142-A5F9-752DFF61078B}" type="datetimeFigureOut">
               <a:rPr lang="ru-RU" smtClean="0"/>
-              <a:t>27.01.2022</a:t>
+              <a:t>10.12.2023</a:t>
             </a:fld>
             <a:endParaRPr lang="ru-RU"/>
           </a:p>
@@ -4476,7 +4476,7 @@
           <a:p>
             <a:fld id="{2D4BD2F8-9F13-D142-A5F9-752DFF61078B}" type="datetimeFigureOut">
               <a:rPr lang="ru-RU" smtClean="0"/>
-              <a:t>27.01.2022</a:t>
+              <a:t>10.12.2023</a:t>
             </a:fld>
             <a:endParaRPr lang="ru-RU"/>
           </a:p>
@@ -4787,7 +4787,7 @@
           <a:p>
             <a:fld id="{2D4BD2F8-9F13-D142-A5F9-752DFF61078B}" type="datetimeFigureOut">
               <a:rPr lang="ru-RU" smtClean="0"/>
-              <a:t>27.01.2022</a:t>
+              <a:t>10.12.2023</a:t>
             </a:fld>
             <a:endParaRPr lang="ru-RU"/>
           </a:p>
@@ -5075,7 +5075,7 @@
           <a:p>
             <a:fld id="{2D4BD2F8-9F13-D142-A5F9-752DFF61078B}" type="datetimeFigureOut">
               <a:rPr lang="ru-RU" smtClean="0"/>
-              <a:t>27.01.2022</a:t>
+              <a:t>10.12.2023</a:t>
             </a:fld>
             <a:endParaRPr lang="ru-RU"/>
           </a:p>
@@ -5316,7 +5316,7 @@
           <a:p>
             <a:fld id="{2D4BD2F8-9F13-D142-A5F9-752DFF61078B}" type="datetimeFigureOut">
               <a:rPr lang="ru-RU" smtClean="0"/>
-              <a:t>27.01.2022</a:t>
+              <a:t>10.12.2023</a:t>
             </a:fld>
             <a:endParaRPr lang="ru-RU"/>
           </a:p>
@@ -5809,223 +5809,6 @@
               <a:t>Python</a:t>
             </a:r>
             <a:endParaRPr dirty="0"/>
-          </a:p>
-        </p:txBody>
-      </p:sp>
-      <p:sp>
-        <p:nvSpPr>
-          <p:cNvPr id="5" name="Text Placeholder 3"/>
-          <p:cNvSpPr>
-            <a:spLocks/>
-          </p:cNvSpPr>
-          <p:nvPr/>
-        </p:nvSpPr>
-        <p:spPr bwMode="auto">
-          <a:xfrm>
-            <a:off x="685800" y="5229200"/>
-            <a:ext cx="10793228" cy="552685"/>
-          </a:xfrm>
-          <a:prstGeom prst="rect">
-            <a:avLst/>
-          </a:prstGeom>
-        </p:spPr>
-        <p:txBody>
-          <a:bodyPr lIns="0" tIns="0" rIns="0" bIns="0"/>
-          <a:lstStyle>
-            <a:lvl1pPr marL="228600" indent="-228600" algn="l" defTabSz="914400">
-              <a:lnSpc>
-                <a:spcPct val="90000"/>
-              </a:lnSpc>
-              <a:spcBef>
-                <a:spcPts val="1000"/>
-              </a:spcBef>
-              <a:buFont typeface="Arial"/>
-              <a:buChar char="•"/>
-              <a:defRPr sz="2800" b="0" i="0">
-                <a:solidFill>
-                  <a:schemeClr val="tx1"/>
-                </a:solidFill>
-                <a:latin typeface="SB Sans Display Regular"/>
-                <a:ea typeface="+mn-ea"/>
-                <a:cs typeface="+mn-cs"/>
-              </a:defRPr>
-            </a:lvl1pPr>
-            <a:lvl2pPr marL="685800" indent="-228600" algn="l" defTabSz="914400">
-              <a:lnSpc>
-                <a:spcPct val="90000"/>
-              </a:lnSpc>
-              <a:spcBef>
-                <a:spcPts val="500"/>
-              </a:spcBef>
-              <a:buFont typeface="Arial"/>
-              <a:buChar char="•"/>
-              <a:defRPr sz="2400" b="0" i="0">
-                <a:solidFill>
-                  <a:schemeClr val="tx1"/>
-                </a:solidFill>
-                <a:latin typeface="SB Sans Display Regular"/>
-                <a:ea typeface="+mn-ea"/>
-                <a:cs typeface="+mn-cs"/>
-              </a:defRPr>
-            </a:lvl2pPr>
-            <a:lvl3pPr marL="1143000" indent="-228600" algn="l" defTabSz="914400">
-              <a:lnSpc>
-                <a:spcPct val="90000"/>
-              </a:lnSpc>
-              <a:spcBef>
-                <a:spcPts val="500"/>
-              </a:spcBef>
-              <a:buFont typeface="Arial"/>
-              <a:buChar char="•"/>
-              <a:defRPr sz="2000" b="0" i="0">
-                <a:solidFill>
-                  <a:schemeClr val="tx1"/>
-                </a:solidFill>
-                <a:latin typeface="SB Sans Display Regular"/>
-                <a:ea typeface="+mn-ea"/>
-                <a:cs typeface="+mn-cs"/>
-              </a:defRPr>
-            </a:lvl3pPr>
-            <a:lvl4pPr marL="1600200" indent="-228600" algn="l" defTabSz="914400">
-              <a:lnSpc>
-                <a:spcPct val="90000"/>
-              </a:lnSpc>
-              <a:spcBef>
-                <a:spcPts val="500"/>
-              </a:spcBef>
-              <a:buFont typeface="Arial"/>
-              <a:buChar char="•"/>
-              <a:defRPr sz="1800" b="0" i="0">
-                <a:solidFill>
-                  <a:schemeClr val="tx1"/>
-                </a:solidFill>
-                <a:latin typeface="SB Sans Display Regular"/>
-                <a:ea typeface="+mn-ea"/>
-                <a:cs typeface="+mn-cs"/>
-              </a:defRPr>
-            </a:lvl4pPr>
-            <a:lvl5pPr marL="2057400" indent="-228600" algn="l" defTabSz="914400">
-              <a:lnSpc>
-                <a:spcPct val="90000"/>
-              </a:lnSpc>
-              <a:spcBef>
-                <a:spcPts val="500"/>
-              </a:spcBef>
-              <a:buFont typeface="Arial"/>
-              <a:buChar char="•"/>
-              <a:defRPr sz="1800" b="0" i="0">
-                <a:solidFill>
-                  <a:schemeClr val="tx1"/>
-                </a:solidFill>
-                <a:latin typeface="SB Sans Display Regular"/>
-                <a:ea typeface="+mn-ea"/>
-                <a:cs typeface="+mn-cs"/>
-              </a:defRPr>
-            </a:lvl5pPr>
-            <a:lvl6pPr marL="2514600" indent="-228600" algn="l" defTabSz="914400">
-              <a:lnSpc>
-                <a:spcPct val="90000"/>
-              </a:lnSpc>
-              <a:spcBef>
-                <a:spcPts val="500"/>
-              </a:spcBef>
-              <a:buFont typeface="Arial"/>
-              <a:buChar char="•"/>
-              <a:defRPr sz="1800">
-                <a:solidFill>
-                  <a:schemeClr val="tx1"/>
-                </a:solidFill>
-                <a:latin typeface="+mn-lt"/>
-                <a:ea typeface="+mn-ea"/>
-                <a:cs typeface="+mn-cs"/>
-              </a:defRPr>
-            </a:lvl6pPr>
-            <a:lvl7pPr marL="2971800" indent="-228600" algn="l" defTabSz="914400">
-              <a:lnSpc>
-                <a:spcPct val="90000"/>
-              </a:lnSpc>
-              <a:spcBef>
-                <a:spcPts val="500"/>
-              </a:spcBef>
-              <a:buFont typeface="Arial"/>
-              <a:buChar char="•"/>
-              <a:defRPr sz="1800">
-                <a:solidFill>
-                  <a:schemeClr val="tx1"/>
-                </a:solidFill>
-                <a:latin typeface="+mn-lt"/>
-                <a:ea typeface="+mn-ea"/>
-                <a:cs typeface="+mn-cs"/>
-              </a:defRPr>
-            </a:lvl7pPr>
-            <a:lvl8pPr marL="3429000" indent="-228600" algn="l" defTabSz="914400">
-              <a:lnSpc>
-                <a:spcPct val="90000"/>
-              </a:lnSpc>
-              <a:spcBef>
-                <a:spcPts val="500"/>
-              </a:spcBef>
-              <a:buFont typeface="Arial"/>
-              <a:buChar char="•"/>
-              <a:defRPr sz="1800">
-                <a:solidFill>
-                  <a:schemeClr val="tx1"/>
-                </a:solidFill>
-                <a:latin typeface="+mn-lt"/>
-                <a:ea typeface="+mn-ea"/>
-                <a:cs typeface="+mn-cs"/>
-              </a:defRPr>
-            </a:lvl8pPr>
-            <a:lvl9pPr marL="3886200" indent="-228600" algn="l" defTabSz="914400">
-              <a:lnSpc>
-                <a:spcPct val="90000"/>
-              </a:lnSpc>
-              <a:spcBef>
-                <a:spcPts val="500"/>
-              </a:spcBef>
-              <a:buFont typeface="Arial"/>
-              <a:buChar char="•"/>
-              <a:defRPr sz="1800">
-                <a:solidFill>
-                  <a:schemeClr val="tx1"/>
-                </a:solidFill>
-                <a:latin typeface="+mn-lt"/>
-                <a:ea typeface="+mn-ea"/>
-                <a:cs typeface="+mn-cs"/>
-              </a:defRPr>
-            </a:lvl9pPr>
-          </a:lstStyle>
-          <a:p>
-            <a:pPr marL="0" marR="0" lvl="0" indent="0" algn="l" defTabSz="360000">
-              <a:lnSpc>
-                <a:spcPct val="100000"/>
-              </a:lnSpc>
-              <a:spcBef>
-                <a:spcPts val="0"/>
-              </a:spcBef>
-              <a:spcAft>
-                <a:spcPts val="0"/>
-              </a:spcAft>
-              <a:buClrTx/>
-              <a:buSzTx/>
-              <a:buFont typeface="Arial"/>
-              <a:buNone/>
-              <a:defRPr/>
-            </a:pPr>
-            <a:r>
-              <a:rPr lang="en-US" sz="1600" b="0" i="0" u="none" strike="noStrike" cap="none" spc="0" dirty="0">
-                <a:ln>
-                  <a:noFill/>
-                </a:ln>
-                <a:solidFill>
-                  <a:srgbClr val="333F48"/>
-                </a:solidFill>
-                <a:latin typeface="SB Sans Text Light"/>
-                <a:ea typeface="+mn-ea"/>
-                <a:cs typeface="SB Sans Text Light"/>
-              </a:rPr>
-              <a:t>Reboot DS</a:t>
-            </a:r>
           </a:p>
         </p:txBody>
       </p:sp>

</xml_diff>